<commit_message>
add some Coligo/Knative pictures
</commit_message>
<xml_diff>
--- a/docs/image-sources/example-figures.pptx
+++ b/docs/image-sources/example-figures.pptx
@@ -5,11 +5,12 @@
     <p:sldMasterId id="2147483648" r:id="rId1"/>
   </p:sldMasterIdLst>
   <p:notesMasterIdLst>
-    <p:notesMasterId r:id="rId4"/>
+    <p:notesMasterId r:id="rId5"/>
   </p:notesMasterIdLst>
   <p:sldIdLst>
     <p:sldId id="141168576" r:id="rId2"/>
     <p:sldId id="141168577" r:id="rId3"/>
+    <p:sldId id="141168578" r:id="rId4"/>
   </p:sldIdLst>
   <p:sldSz cx="12192000" cy="6858000"/>
   <p:notesSz cx="6858000" cy="9144000"/>
@@ -198,7 +199,7 @@
           <a:p>
             <a:fld id="{DC65C951-F6DB-3040-8A26-A34F90C6DE08}" type="datetimeFigureOut">
               <a:rPr lang="en-US" smtClean="0"/>
-              <a:t>4/16/20</a:t>
+              <a:t>6/25/20</a:t>
             </a:fld>
             <a:endParaRPr lang="en-US"/>
           </a:p>
@@ -780,7 +781,7 @@
           <a:p>
             <a:fld id="{F924721D-9C5E-6B49-AC5B-655F66DDA7A3}" type="datetime1">
               <a:rPr lang="en-US" smtClean="0"/>
-              <a:t>4/16/20</a:t>
+              <a:t>6/25/20</a:t>
             </a:fld>
             <a:endParaRPr lang="en-US"/>
           </a:p>
@@ -978,7 +979,7 @@
           <a:p>
             <a:fld id="{410D5C4C-AC47-7642-B604-A05A66F14757}" type="datetime1">
               <a:rPr lang="en-US" smtClean="0"/>
-              <a:t>4/16/20</a:t>
+              <a:t>6/25/20</a:t>
             </a:fld>
             <a:endParaRPr lang="en-US"/>
           </a:p>
@@ -1186,7 +1187,7 @@
           <a:p>
             <a:fld id="{81BFAE4C-29D7-A84F-A4B9-15F332B42075}" type="datetime1">
               <a:rPr lang="en-US" smtClean="0"/>
-              <a:t>4/16/20</a:t>
+              <a:t>6/25/20</a:t>
             </a:fld>
             <a:endParaRPr lang="en-US"/>
           </a:p>
@@ -1384,7 +1385,7 @@
           <a:p>
             <a:fld id="{F32190BF-3CB9-4F4C-9755-39D6FE4B7A74}" type="datetime1">
               <a:rPr lang="en-US" smtClean="0"/>
-              <a:t>4/16/20</a:t>
+              <a:t>6/25/20</a:t>
             </a:fld>
             <a:endParaRPr lang="en-US"/>
           </a:p>
@@ -1659,7 +1660,7 @@
           <a:p>
             <a:fld id="{E19308FC-30CC-9741-A0ED-8F155680C791}" type="datetime1">
               <a:rPr lang="en-US" smtClean="0"/>
-              <a:t>4/16/20</a:t>
+              <a:t>6/25/20</a:t>
             </a:fld>
             <a:endParaRPr lang="en-US"/>
           </a:p>
@@ -1924,7 +1925,7 @@
           <a:p>
             <a:fld id="{6841A4A3-0324-C64F-9FE7-6903EC895BB9}" type="datetime1">
               <a:rPr lang="en-US" smtClean="0"/>
-              <a:t>4/16/20</a:t>
+              <a:t>6/25/20</a:t>
             </a:fld>
             <a:endParaRPr lang="en-US"/>
           </a:p>
@@ -2336,7 +2337,7 @@
           <a:p>
             <a:fld id="{1E90409D-4799-CD41-898D-FC6CC1258871}" type="datetime1">
               <a:rPr lang="en-US" smtClean="0"/>
-              <a:t>4/16/20</a:t>
+              <a:t>6/25/20</a:t>
             </a:fld>
             <a:endParaRPr lang="en-US"/>
           </a:p>
@@ -2477,7 +2478,7 @@
           <a:p>
             <a:fld id="{34C43BAA-C11F-FD4E-8D10-9852881CF7D8}" type="datetime1">
               <a:rPr lang="en-US" smtClean="0"/>
-              <a:t>4/16/20</a:t>
+              <a:t>6/25/20</a:t>
             </a:fld>
             <a:endParaRPr lang="en-US"/>
           </a:p>
@@ -2590,7 +2591,7 @@
           <a:p>
             <a:fld id="{D997C73D-4315-D949-8336-F9609DECEE68}" type="datetime1">
               <a:rPr lang="en-US" smtClean="0"/>
-              <a:t>4/16/20</a:t>
+              <a:t>6/25/20</a:t>
             </a:fld>
             <a:endParaRPr lang="en-US"/>
           </a:p>
@@ -2901,7 +2902,7 @@
           <a:p>
             <a:fld id="{392654A9-410C-824C-82D8-C652E365CD9E}" type="datetime1">
               <a:rPr lang="en-US" smtClean="0"/>
-              <a:t>4/16/20</a:t>
+              <a:t>6/25/20</a:t>
             </a:fld>
             <a:endParaRPr lang="en-US"/>
           </a:p>
@@ -3189,7 +3190,7 @@
           <a:p>
             <a:fld id="{8A615C88-D66E-A94A-8D6A-02B32F892117}" type="datetime1">
               <a:rPr lang="en-US" smtClean="0"/>
-              <a:t>4/16/20</a:t>
+              <a:t>6/25/20</a:t>
             </a:fld>
             <a:endParaRPr lang="en-US"/>
           </a:p>
@@ -3430,7 +3431,7 @@
           <a:p>
             <a:fld id="{CD1EC2A6-1E91-8048-8D30-369F2C578845}" type="datetime1">
               <a:rPr lang="en-US" smtClean="0"/>
-              <a:t>4/16/20</a:t>
+              <a:t>6/25/20</a:t>
             </a:fld>
             <a:endParaRPr lang="en-US"/>
           </a:p>
@@ -6827,6 +6828,1788 @@
       </p:par>
     </p:tnLst>
   </p:timing>
+</p:sld>
+</file>
+
+<file path=ppt/slides/slide3.xml><?xml version="1.0" encoding="utf-8"?>
+<p:sld xmlns:a="http://schemas.openxmlformats.org/drawingml/2006/main" xmlns:r="http://schemas.openxmlformats.org/officeDocument/2006/relationships" xmlns:p="http://schemas.openxmlformats.org/presentationml/2006/main">
+  <p:cSld>
+    <p:spTree>
+      <p:nvGrpSpPr>
+        <p:cNvPr id="1" name=""/>
+        <p:cNvGrpSpPr/>
+        <p:nvPr/>
+      </p:nvGrpSpPr>
+      <p:grpSpPr>
+        <a:xfrm>
+          <a:off x="0" y="0"/>
+          <a:ext cx="0" cy="0"/>
+          <a:chOff x="0" y="0"/>
+          <a:chExt cx="0" cy="0"/>
+        </a:xfrm>
+      </p:grpSpPr>
+      <p:sp>
+        <p:nvSpPr>
+          <p:cNvPr id="2" name="Slide Number Placeholder 1">
+            <a:extLst>
+              <a:ext uri="{FF2B5EF4-FFF2-40B4-BE49-F238E27FC236}">
+                <a16:creationId xmlns:a16="http://schemas.microsoft.com/office/drawing/2014/main" id="{5D4C3D79-C074-6447-AF7F-D7AA8CA7A6ED}"/>
+              </a:ext>
+            </a:extLst>
+          </p:cNvPr>
+          <p:cNvSpPr>
+            <a:spLocks noGrp="1"/>
+          </p:cNvSpPr>
+          <p:nvPr>
+            <p:ph type="sldNum" sz="quarter" idx="12"/>
+          </p:nvPr>
+        </p:nvSpPr>
+        <p:spPr/>
+        <p:txBody>
+          <a:bodyPr/>
+          <a:lstStyle/>
+          <a:p>
+            <a:fld id="{FC517010-E647-2249-A958-B3027541DB25}" type="slidenum">
+              <a:rPr lang="en-US" smtClean="0"/>
+              <a:t>3</a:t>
+            </a:fld>
+            <a:endParaRPr lang="en-US"/>
+          </a:p>
+        </p:txBody>
+      </p:sp>
+      <p:sp>
+        <p:nvSpPr>
+          <p:cNvPr id="3" name="Rounded Rectangle 2">
+            <a:extLst>
+              <a:ext uri="{FF2B5EF4-FFF2-40B4-BE49-F238E27FC236}">
+                <a16:creationId xmlns:a16="http://schemas.microsoft.com/office/drawing/2014/main" id="{E93416A8-5376-E040-B900-53BC9065028C}"/>
+              </a:ext>
+            </a:extLst>
+          </p:cNvPr>
+          <p:cNvSpPr/>
+          <p:nvPr/>
+        </p:nvSpPr>
+        <p:spPr>
+          <a:xfrm>
+            <a:off x="2996661" y="378313"/>
+            <a:ext cx="2309447" cy="1031631"/>
+          </a:xfrm>
+          <a:prstGeom prst="roundRect">
+            <a:avLst/>
+          </a:prstGeom>
+        </p:spPr>
+        <p:style>
+          <a:lnRef idx="2">
+            <a:schemeClr val="accent1">
+              <a:shade val="50000"/>
+            </a:schemeClr>
+          </a:lnRef>
+          <a:fillRef idx="1">
+            <a:schemeClr val="accent1"/>
+          </a:fillRef>
+          <a:effectRef idx="0">
+            <a:schemeClr val="accent1"/>
+          </a:effectRef>
+          <a:fontRef idx="minor">
+            <a:schemeClr val="lt1"/>
+          </a:fontRef>
+        </p:style>
+        <p:txBody>
+          <a:bodyPr rtlCol="0" anchor="ctr"/>
+          <a:lstStyle/>
+          <a:p>
+            <a:pPr algn="ctr"/>
+            <a:r>
+              <a:rPr lang="en-US" sz="2400" dirty="0" err="1"/>
+              <a:t>EventStreams</a:t>
+            </a:r>
+            <a:endParaRPr lang="en-US" sz="2400" dirty="0"/>
+          </a:p>
+        </p:txBody>
+      </p:sp>
+      <p:sp>
+        <p:nvSpPr>
+          <p:cNvPr id="4" name="Can 3">
+            <a:extLst>
+              <a:ext uri="{FF2B5EF4-FFF2-40B4-BE49-F238E27FC236}">
+                <a16:creationId xmlns:a16="http://schemas.microsoft.com/office/drawing/2014/main" id="{EFFE007F-313D-F846-A72C-149B70D5AF7D}"/>
+              </a:ext>
+            </a:extLst>
+          </p:cNvPr>
+          <p:cNvSpPr/>
+          <p:nvPr/>
+        </p:nvSpPr>
+        <p:spPr>
+          <a:xfrm>
+            <a:off x="6189384" y="196931"/>
+            <a:ext cx="1250526" cy="1394396"/>
+          </a:xfrm>
+          <a:prstGeom prst="can">
+            <a:avLst/>
+          </a:prstGeom>
+        </p:spPr>
+        <p:style>
+          <a:lnRef idx="2">
+            <a:schemeClr val="accent1">
+              <a:shade val="50000"/>
+            </a:schemeClr>
+          </a:lnRef>
+          <a:fillRef idx="1">
+            <a:schemeClr val="accent1"/>
+          </a:fillRef>
+          <a:effectRef idx="0">
+            <a:schemeClr val="accent1"/>
+          </a:effectRef>
+          <a:fontRef idx="minor">
+            <a:schemeClr val="lt1"/>
+          </a:fontRef>
+        </p:style>
+        <p:txBody>
+          <a:bodyPr rtlCol="0" anchor="ctr"/>
+          <a:lstStyle/>
+          <a:p>
+            <a:pPr algn="ctr"/>
+            <a:r>
+              <a:rPr lang="en-US" sz="2400" dirty="0"/>
+              <a:t>ICD for Redis</a:t>
+            </a:r>
+            <a:endParaRPr lang="en-US" dirty="0"/>
+          </a:p>
+        </p:txBody>
+      </p:sp>
+      <p:sp>
+        <p:nvSpPr>
+          <p:cNvPr id="5" name="TextBox 4">
+            <a:extLst>
+              <a:ext uri="{FF2B5EF4-FFF2-40B4-BE49-F238E27FC236}">
+                <a16:creationId xmlns:a16="http://schemas.microsoft.com/office/drawing/2014/main" id="{33722C88-7A87-B54A-A2E2-E311046A4AE5}"/>
+              </a:ext>
+            </a:extLst>
+          </p:cNvPr>
+          <p:cNvSpPr txBox="1"/>
+          <p:nvPr/>
+        </p:nvSpPr>
+        <p:spPr>
+          <a:xfrm>
+            <a:off x="199697" y="570962"/>
+            <a:ext cx="2154621" cy="646331"/>
+          </a:xfrm>
+          <a:prstGeom prst="rect">
+            <a:avLst/>
+          </a:prstGeom>
+          <a:noFill/>
+        </p:spPr>
+        <p:txBody>
+          <a:bodyPr wrap="square" rtlCol="0">
+            <a:spAutoFit/>
+          </a:bodyPr>
+          <a:lstStyle/>
+          <a:p>
+            <a:r>
+              <a:rPr lang="en-US" dirty="0"/>
+              <a:t>IBM Public Cloud Managed Services</a:t>
+            </a:r>
+          </a:p>
+        </p:txBody>
+      </p:sp>
+      <p:cxnSp>
+        <p:nvCxnSpPr>
+          <p:cNvPr id="7" name="Straight Connector 6">
+            <a:extLst>
+              <a:ext uri="{FF2B5EF4-FFF2-40B4-BE49-F238E27FC236}">
+                <a16:creationId xmlns:a16="http://schemas.microsoft.com/office/drawing/2014/main" id="{031B28A2-917F-B348-B48C-9B7EBE34FC09}"/>
+              </a:ext>
+            </a:extLst>
+          </p:cNvPr>
+          <p:cNvCxnSpPr/>
+          <p:nvPr/>
+        </p:nvCxnSpPr>
+        <p:spPr>
+          <a:xfrm>
+            <a:off x="415159" y="1958428"/>
+            <a:ext cx="11361682" cy="0"/>
+          </a:xfrm>
+          <a:prstGeom prst="line">
+            <a:avLst/>
+          </a:prstGeom>
+          <a:ln w="25400">
+            <a:prstDash val="dash"/>
+          </a:ln>
+        </p:spPr>
+        <p:style>
+          <a:lnRef idx="1">
+            <a:schemeClr val="dk1"/>
+          </a:lnRef>
+          <a:fillRef idx="0">
+            <a:schemeClr val="dk1"/>
+          </a:fillRef>
+          <a:effectRef idx="0">
+            <a:schemeClr val="dk1"/>
+          </a:effectRef>
+          <a:fontRef idx="minor">
+            <a:schemeClr val="tx1"/>
+          </a:fontRef>
+        </p:style>
+      </p:cxnSp>
+      <p:cxnSp>
+        <p:nvCxnSpPr>
+          <p:cNvPr id="8" name="Straight Connector 7">
+            <a:extLst>
+              <a:ext uri="{FF2B5EF4-FFF2-40B4-BE49-F238E27FC236}">
+                <a16:creationId xmlns:a16="http://schemas.microsoft.com/office/drawing/2014/main" id="{F8715B60-1E85-1A45-84B1-57DB559A1080}"/>
+              </a:ext>
+            </a:extLst>
+          </p:cNvPr>
+          <p:cNvCxnSpPr>
+            <a:cxnSpLocks/>
+          </p:cNvCxnSpPr>
+          <p:nvPr/>
+        </p:nvCxnSpPr>
+        <p:spPr>
+          <a:xfrm>
+            <a:off x="5689600" y="2336800"/>
+            <a:ext cx="0" cy="3225800"/>
+          </a:xfrm>
+          <a:prstGeom prst="line">
+            <a:avLst/>
+          </a:prstGeom>
+          <a:ln w="25400">
+            <a:prstDash val="dash"/>
+          </a:ln>
+        </p:spPr>
+        <p:style>
+          <a:lnRef idx="1">
+            <a:schemeClr val="dk1"/>
+          </a:lnRef>
+          <a:fillRef idx="0">
+            <a:schemeClr val="dk1"/>
+          </a:fillRef>
+          <a:effectRef idx="0">
+            <a:schemeClr val="dk1"/>
+          </a:effectRef>
+          <a:fontRef idx="minor">
+            <a:schemeClr val="tx1"/>
+          </a:fontRef>
+        </p:style>
+      </p:cxnSp>
+      <p:sp>
+        <p:nvSpPr>
+          <p:cNvPr id="13" name="TextBox 12">
+            <a:extLst>
+              <a:ext uri="{FF2B5EF4-FFF2-40B4-BE49-F238E27FC236}">
+                <a16:creationId xmlns:a16="http://schemas.microsoft.com/office/drawing/2014/main" id="{6FCE9D32-5EB7-F348-8C9A-C3FE2DF5F93E}"/>
+              </a:ext>
+            </a:extLst>
+          </p:cNvPr>
+          <p:cNvSpPr txBox="1"/>
+          <p:nvPr/>
+        </p:nvSpPr>
+        <p:spPr>
+          <a:xfrm>
+            <a:off x="9400597" y="2097190"/>
+            <a:ext cx="2870200" cy="369332"/>
+          </a:xfrm>
+          <a:prstGeom prst="rect">
+            <a:avLst/>
+          </a:prstGeom>
+          <a:noFill/>
+        </p:spPr>
+        <p:txBody>
+          <a:bodyPr wrap="square" rtlCol="0">
+            <a:spAutoFit/>
+          </a:bodyPr>
+          <a:lstStyle/>
+          <a:p>
+            <a:r>
+              <a:rPr lang="en-US" dirty="0"/>
+              <a:t>IBM Public Cloud - </a:t>
+            </a:r>
+            <a:r>
+              <a:rPr lang="en-US" dirty="0" err="1"/>
+              <a:t>Coligo</a:t>
+            </a:r>
+            <a:endParaRPr lang="en-US" dirty="0"/>
+          </a:p>
+        </p:txBody>
+      </p:sp>
+      <p:grpSp>
+        <p:nvGrpSpPr>
+          <p:cNvPr id="14" name="Group 13">
+            <a:extLst>
+              <a:ext uri="{FF2B5EF4-FFF2-40B4-BE49-F238E27FC236}">
+                <a16:creationId xmlns:a16="http://schemas.microsoft.com/office/drawing/2014/main" id="{76D93F80-9EC0-C845-80CA-566A7C15A8EE}"/>
+              </a:ext>
+            </a:extLst>
+          </p:cNvPr>
+          <p:cNvGrpSpPr/>
+          <p:nvPr/>
+        </p:nvGrpSpPr>
+        <p:grpSpPr>
+          <a:xfrm>
+            <a:off x="6076497" y="2798234"/>
+            <a:ext cx="2527298" cy="3412182"/>
+            <a:chOff x="7626667" y="936448"/>
+            <a:chExt cx="3181605" cy="3958105"/>
+          </a:xfrm>
+        </p:grpSpPr>
+        <p:sp>
+          <p:nvSpPr>
+            <p:cNvPr id="15" name="Rectangle 14">
+              <a:extLst>
+                <a:ext uri="{FF2B5EF4-FFF2-40B4-BE49-F238E27FC236}">
+                  <a16:creationId xmlns:a16="http://schemas.microsoft.com/office/drawing/2014/main" id="{AAAE6964-E18F-7045-AE68-1D00A00A186D}"/>
+                </a:ext>
+              </a:extLst>
+            </p:cNvPr>
+            <p:cNvSpPr/>
+            <p:nvPr/>
+          </p:nvSpPr>
+          <p:spPr>
+            <a:xfrm>
+              <a:off x="7665679" y="942663"/>
+              <a:ext cx="3142593" cy="3951890"/>
+            </a:xfrm>
+            <a:prstGeom prst="rect">
+              <a:avLst/>
+            </a:prstGeom>
+            <a:solidFill>
+              <a:schemeClr val="accent2">
+                <a:lumMod val="40000"/>
+                <a:lumOff val="60000"/>
+              </a:schemeClr>
+            </a:solidFill>
+          </p:spPr>
+          <p:style>
+            <a:lnRef idx="2">
+              <a:schemeClr val="accent1">
+                <a:shade val="50000"/>
+              </a:schemeClr>
+            </a:lnRef>
+            <a:fillRef idx="1">
+              <a:schemeClr val="accent1"/>
+            </a:fillRef>
+            <a:effectRef idx="0">
+              <a:schemeClr val="accent1"/>
+            </a:effectRef>
+            <a:fontRef idx="minor">
+              <a:schemeClr val="lt1"/>
+            </a:fontRef>
+          </p:style>
+          <p:txBody>
+            <a:bodyPr rtlCol="0" anchor="ctr"/>
+            <a:lstStyle/>
+            <a:p>
+              <a:pPr algn="ctr"/>
+              <a:r>
+                <a:rPr lang="en-US" dirty="0"/>
+                <a:t>po</a:t>
+              </a:r>
+            </a:p>
+          </p:txBody>
+        </p:sp>
+        <p:sp>
+          <p:nvSpPr>
+            <p:cNvPr id="16" name="Rectangle 15">
+              <a:extLst>
+                <a:ext uri="{FF2B5EF4-FFF2-40B4-BE49-F238E27FC236}">
+                  <a16:creationId xmlns:a16="http://schemas.microsoft.com/office/drawing/2014/main" id="{7ACE6B21-68BF-8049-B616-B9E2C6570547}"/>
+                </a:ext>
+              </a:extLst>
+            </p:cNvPr>
+            <p:cNvSpPr/>
+            <p:nvPr/>
+          </p:nvSpPr>
+          <p:spPr>
+            <a:xfrm>
+              <a:off x="7957743" y="1334814"/>
+              <a:ext cx="2617076" cy="2289895"/>
+            </a:xfrm>
+            <a:prstGeom prst="rect">
+              <a:avLst/>
+            </a:prstGeom>
+            <a:solidFill>
+              <a:srgbClr val="FFFF00"/>
+            </a:solidFill>
+          </p:spPr>
+          <p:style>
+            <a:lnRef idx="2">
+              <a:schemeClr val="accent1">
+                <a:shade val="50000"/>
+              </a:schemeClr>
+            </a:lnRef>
+            <a:fillRef idx="1">
+              <a:schemeClr val="accent1"/>
+            </a:fillRef>
+            <a:effectRef idx="0">
+              <a:schemeClr val="accent1"/>
+            </a:effectRef>
+            <a:fontRef idx="minor">
+              <a:schemeClr val="lt1"/>
+            </a:fontRef>
+          </p:style>
+          <p:txBody>
+            <a:bodyPr rtlCol="0" anchor="ctr"/>
+            <a:lstStyle/>
+            <a:p>
+              <a:pPr algn="ctr"/>
+              <a:endParaRPr lang="en-US"/>
+            </a:p>
+          </p:txBody>
+        </p:sp>
+        <p:sp>
+          <p:nvSpPr>
+            <p:cNvPr id="17" name="TextBox 16">
+              <a:extLst>
+                <a:ext uri="{FF2B5EF4-FFF2-40B4-BE49-F238E27FC236}">
+                  <a16:creationId xmlns:a16="http://schemas.microsoft.com/office/drawing/2014/main" id="{F966FB8C-A263-8C4B-9927-17C9CA077F9D}"/>
+                </a:ext>
+              </a:extLst>
+            </p:cNvPr>
+            <p:cNvSpPr txBox="1"/>
+            <p:nvPr/>
+          </p:nvSpPr>
+          <p:spPr>
+            <a:xfrm>
+              <a:off x="8222929" y="2918608"/>
+              <a:ext cx="2086707" cy="307777"/>
+            </a:xfrm>
+            <a:prstGeom prst="rect">
+              <a:avLst/>
+            </a:prstGeom>
+            <a:solidFill>
+              <a:schemeClr val="accent6"/>
+            </a:solidFill>
+          </p:spPr>
+          <p:txBody>
+            <a:bodyPr wrap="square" rtlCol="0">
+              <a:spAutoFit/>
+            </a:bodyPr>
+            <a:lstStyle/>
+            <a:p>
+              <a:pPr algn="ctr"/>
+              <a:r>
+                <a:rPr lang="en-US" sz="1400" dirty="0">
+                  <a:solidFill>
+                    <a:schemeClr val="bg1"/>
+                  </a:solidFill>
+                </a:rPr>
+                <a:t>YKT simulation server</a:t>
+              </a:r>
+            </a:p>
+          </p:txBody>
+        </p:sp>
+        <p:sp>
+          <p:nvSpPr>
+            <p:cNvPr id="18" name="TextBox 17">
+              <a:extLst>
+                <a:ext uri="{FF2B5EF4-FFF2-40B4-BE49-F238E27FC236}">
+                  <a16:creationId xmlns:a16="http://schemas.microsoft.com/office/drawing/2014/main" id="{20EE30E6-1AA1-A047-A840-B1EA51B55E9E}"/>
+                </a:ext>
+              </a:extLst>
+            </p:cNvPr>
+            <p:cNvSpPr txBox="1"/>
+            <p:nvPr/>
+          </p:nvSpPr>
+          <p:spPr>
+            <a:xfrm>
+              <a:off x="8222928" y="1762214"/>
+              <a:ext cx="2086707" cy="307777"/>
+            </a:xfrm>
+            <a:prstGeom prst="rect">
+              <a:avLst/>
+            </a:prstGeom>
+            <a:solidFill>
+              <a:srgbClr val="0070C0"/>
+            </a:solidFill>
+          </p:spPr>
+          <p:txBody>
+            <a:bodyPr wrap="square" rtlCol="0">
+              <a:spAutoFit/>
+            </a:bodyPr>
+            <a:lstStyle/>
+            <a:p>
+              <a:pPr algn="ctr"/>
+              <a:r>
+                <a:rPr lang="en-US" sz="1400" dirty="0">
+                  <a:solidFill>
+                    <a:schemeClr val="bg1"/>
+                  </a:solidFill>
+                </a:rPr>
+                <a:t>KAR sidecar</a:t>
+              </a:r>
+            </a:p>
+          </p:txBody>
+        </p:sp>
+        <p:cxnSp>
+          <p:nvCxnSpPr>
+            <p:cNvPr id="19" name="Straight Arrow Connector 18">
+              <a:extLst>
+                <a:ext uri="{FF2B5EF4-FFF2-40B4-BE49-F238E27FC236}">
+                  <a16:creationId xmlns:a16="http://schemas.microsoft.com/office/drawing/2014/main" id="{DF86C480-6A5F-CD46-B17F-4BA01ABCF4E7}"/>
+                </a:ext>
+              </a:extLst>
+            </p:cNvPr>
+            <p:cNvCxnSpPr>
+              <a:cxnSpLocks/>
+              <a:stCxn id="18" idx="2"/>
+              <a:endCxn id="17" idx="0"/>
+            </p:cNvCxnSpPr>
+            <p:nvPr/>
+          </p:nvCxnSpPr>
+          <p:spPr>
+            <a:xfrm>
+              <a:off x="9266282" y="2069991"/>
+              <a:ext cx="1" cy="848617"/>
+            </a:xfrm>
+            <a:prstGeom prst="straightConnector1">
+              <a:avLst/>
+            </a:prstGeom>
+            <a:ln w="38100">
+              <a:headEnd type="triangle"/>
+              <a:tailEnd type="triangle"/>
+            </a:ln>
+          </p:spPr>
+          <p:style>
+            <a:lnRef idx="1">
+              <a:schemeClr val="accent1"/>
+            </a:lnRef>
+            <a:fillRef idx="0">
+              <a:schemeClr val="accent1"/>
+            </a:fillRef>
+            <a:effectRef idx="0">
+              <a:schemeClr val="accent1"/>
+            </a:effectRef>
+            <a:fontRef idx="minor">
+              <a:schemeClr val="tx1"/>
+            </a:fontRef>
+          </p:style>
+        </p:cxnSp>
+        <p:sp>
+          <p:nvSpPr>
+            <p:cNvPr id="20" name="TextBox 19">
+              <a:extLst>
+                <a:ext uri="{FF2B5EF4-FFF2-40B4-BE49-F238E27FC236}">
+                  <a16:creationId xmlns:a16="http://schemas.microsoft.com/office/drawing/2014/main" id="{E437AE14-D373-4A4B-8387-B682CDB7BE35}"/>
+                </a:ext>
+              </a:extLst>
+            </p:cNvPr>
+            <p:cNvSpPr txBox="1"/>
+            <p:nvPr/>
+          </p:nvSpPr>
+          <p:spPr>
+            <a:xfrm>
+              <a:off x="9266281" y="2399833"/>
+              <a:ext cx="914400" cy="369332"/>
+            </a:xfrm>
+            <a:prstGeom prst="rect">
+              <a:avLst/>
+            </a:prstGeom>
+            <a:noFill/>
+          </p:spPr>
+          <p:txBody>
+            <a:bodyPr wrap="square" rtlCol="0">
+              <a:spAutoFit/>
+            </a:bodyPr>
+            <a:lstStyle/>
+            <a:p>
+              <a:r>
+                <a:rPr lang="en-US" dirty="0"/>
+                <a:t>http</a:t>
+              </a:r>
+            </a:p>
+          </p:txBody>
+        </p:sp>
+        <p:sp>
+          <p:nvSpPr>
+            <p:cNvPr id="21" name="Rectangle 20">
+              <a:extLst>
+                <a:ext uri="{FF2B5EF4-FFF2-40B4-BE49-F238E27FC236}">
+                  <a16:creationId xmlns:a16="http://schemas.microsoft.com/office/drawing/2014/main" id="{9B03431F-DCEF-844F-8266-0C43F026792C}"/>
+                </a:ext>
+              </a:extLst>
+            </p:cNvPr>
+            <p:cNvSpPr/>
+            <p:nvPr/>
+          </p:nvSpPr>
+          <p:spPr>
+            <a:xfrm>
+              <a:off x="7957743" y="3822610"/>
+              <a:ext cx="2617076" cy="867412"/>
+            </a:xfrm>
+            <a:prstGeom prst="rect">
+              <a:avLst/>
+            </a:prstGeom>
+            <a:solidFill>
+              <a:srgbClr val="FFFF00"/>
+            </a:solidFill>
+          </p:spPr>
+          <p:style>
+            <a:lnRef idx="2">
+              <a:schemeClr val="accent1">
+                <a:shade val="50000"/>
+              </a:schemeClr>
+            </a:lnRef>
+            <a:fillRef idx="1">
+              <a:schemeClr val="accent1"/>
+            </a:fillRef>
+            <a:effectRef idx="0">
+              <a:schemeClr val="accent1"/>
+            </a:effectRef>
+            <a:fontRef idx="minor">
+              <a:schemeClr val="lt1"/>
+            </a:fontRef>
+          </p:style>
+          <p:txBody>
+            <a:bodyPr rtlCol="0" anchor="ctr"/>
+            <a:lstStyle/>
+            <a:p>
+              <a:pPr algn="ctr"/>
+              <a:endParaRPr lang="en-US"/>
+            </a:p>
+          </p:txBody>
+        </p:sp>
+        <p:sp>
+          <p:nvSpPr>
+            <p:cNvPr id="22" name="TextBox 21">
+              <a:extLst>
+                <a:ext uri="{FF2B5EF4-FFF2-40B4-BE49-F238E27FC236}">
+                  <a16:creationId xmlns:a16="http://schemas.microsoft.com/office/drawing/2014/main" id="{99D5FD90-3AEB-714B-8DF2-B7ED5714E24C}"/>
+                </a:ext>
+              </a:extLst>
+            </p:cNvPr>
+            <p:cNvSpPr txBox="1"/>
+            <p:nvPr/>
+          </p:nvSpPr>
+          <p:spPr>
+            <a:xfrm>
+              <a:off x="8222928" y="4171235"/>
+              <a:ext cx="2086707" cy="307777"/>
+            </a:xfrm>
+            <a:prstGeom prst="rect">
+              <a:avLst/>
+            </a:prstGeom>
+            <a:solidFill>
+              <a:srgbClr val="0070C0"/>
+            </a:solidFill>
+          </p:spPr>
+          <p:txBody>
+            <a:bodyPr wrap="square" rtlCol="0">
+              <a:spAutoFit/>
+            </a:bodyPr>
+            <a:lstStyle/>
+            <a:p>
+              <a:pPr algn="ctr"/>
+              <a:r>
+                <a:rPr lang="en-US" sz="1400" dirty="0" err="1">
+                  <a:solidFill>
+                    <a:schemeClr val="bg1"/>
+                  </a:solidFill>
+                </a:rPr>
+                <a:t>Coligo</a:t>
+              </a:r>
+              <a:r>
+                <a:rPr lang="en-US" sz="1400" dirty="0">
+                  <a:solidFill>
+                    <a:schemeClr val="bg1"/>
+                  </a:solidFill>
+                </a:rPr>
+                <a:t> queue proxy</a:t>
+              </a:r>
+            </a:p>
+          </p:txBody>
+        </p:sp>
+        <p:sp>
+          <p:nvSpPr>
+            <p:cNvPr id="23" name="TextBox 22">
+              <a:extLst>
+                <a:ext uri="{FF2B5EF4-FFF2-40B4-BE49-F238E27FC236}">
+                  <a16:creationId xmlns:a16="http://schemas.microsoft.com/office/drawing/2014/main" id="{5684FCE2-175A-274C-9D8D-8B319027FDEC}"/>
+                </a:ext>
+              </a:extLst>
+            </p:cNvPr>
+            <p:cNvSpPr txBox="1"/>
+            <p:nvPr/>
+          </p:nvSpPr>
+          <p:spPr>
+            <a:xfrm>
+              <a:off x="7626667" y="936448"/>
+              <a:ext cx="662152" cy="307777"/>
+            </a:xfrm>
+            <a:prstGeom prst="rect">
+              <a:avLst/>
+            </a:prstGeom>
+            <a:noFill/>
+          </p:spPr>
+          <p:txBody>
+            <a:bodyPr wrap="square" rtlCol="0">
+              <a:spAutoFit/>
+            </a:bodyPr>
+            <a:lstStyle/>
+            <a:p>
+              <a:r>
+                <a:rPr lang="en-US" sz="1400" dirty="0"/>
+                <a:t>pod</a:t>
+              </a:r>
+            </a:p>
+          </p:txBody>
+        </p:sp>
+        <p:sp>
+          <p:nvSpPr>
+            <p:cNvPr id="24" name="TextBox 23">
+              <a:extLst>
+                <a:ext uri="{FF2B5EF4-FFF2-40B4-BE49-F238E27FC236}">
+                  <a16:creationId xmlns:a16="http://schemas.microsoft.com/office/drawing/2014/main" id="{F29C5268-96A5-444F-96D9-43506D1AF797}"/>
+                </a:ext>
+              </a:extLst>
+            </p:cNvPr>
+            <p:cNvSpPr txBox="1"/>
+            <p:nvPr/>
+          </p:nvSpPr>
+          <p:spPr>
+            <a:xfrm>
+              <a:off x="7961381" y="1373978"/>
+              <a:ext cx="2086706" cy="307777"/>
+            </a:xfrm>
+            <a:prstGeom prst="rect">
+              <a:avLst/>
+            </a:prstGeom>
+            <a:noFill/>
+          </p:spPr>
+          <p:txBody>
+            <a:bodyPr wrap="square" rtlCol="0">
+              <a:spAutoFit/>
+            </a:bodyPr>
+            <a:lstStyle/>
+            <a:p>
+              <a:r>
+                <a:rPr lang="en-US" sz="1400" dirty="0"/>
+                <a:t>user container</a:t>
+              </a:r>
+            </a:p>
+          </p:txBody>
+        </p:sp>
+        <p:sp>
+          <p:nvSpPr>
+            <p:cNvPr id="25" name="TextBox 24">
+              <a:extLst>
+                <a:ext uri="{FF2B5EF4-FFF2-40B4-BE49-F238E27FC236}">
+                  <a16:creationId xmlns:a16="http://schemas.microsoft.com/office/drawing/2014/main" id="{45B77463-F06A-BD4E-8940-19ED5B483123}"/>
+                </a:ext>
+              </a:extLst>
+            </p:cNvPr>
+            <p:cNvSpPr txBox="1"/>
+            <p:nvPr/>
+          </p:nvSpPr>
+          <p:spPr>
+            <a:xfrm>
+              <a:off x="7957743" y="3812257"/>
+              <a:ext cx="2541076" cy="307777"/>
+            </a:xfrm>
+            <a:prstGeom prst="rect">
+              <a:avLst/>
+            </a:prstGeom>
+            <a:noFill/>
+          </p:spPr>
+          <p:txBody>
+            <a:bodyPr wrap="square" rtlCol="0">
+              <a:spAutoFit/>
+            </a:bodyPr>
+            <a:lstStyle/>
+            <a:p>
+              <a:r>
+                <a:rPr lang="en-US" sz="1400" dirty="0" err="1"/>
+                <a:t>Coligo</a:t>
+              </a:r>
+              <a:r>
+                <a:rPr lang="en-US" sz="1400" dirty="0"/>
+                <a:t> system container</a:t>
+              </a:r>
+            </a:p>
+          </p:txBody>
+        </p:sp>
+      </p:grpSp>
+      <p:grpSp>
+        <p:nvGrpSpPr>
+          <p:cNvPr id="26" name="Group 25">
+            <a:extLst>
+              <a:ext uri="{FF2B5EF4-FFF2-40B4-BE49-F238E27FC236}">
+                <a16:creationId xmlns:a16="http://schemas.microsoft.com/office/drawing/2014/main" id="{9AE544B1-4AC5-4D4F-BDFC-22E22FA02ABD}"/>
+              </a:ext>
+            </a:extLst>
+          </p:cNvPr>
+          <p:cNvGrpSpPr/>
+          <p:nvPr/>
+        </p:nvGrpSpPr>
+        <p:grpSpPr>
+          <a:xfrm>
+            <a:off x="9457786" y="2798234"/>
+            <a:ext cx="2527298" cy="3412182"/>
+            <a:chOff x="7626667" y="936448"/>
+            <a:chExt cx="3181605" cy="3958105"/>
+          </a:xfrm>
+        </p:grpSpPr>
+        <p:sp>
+          <p:nvSpPr>
+            <p:cNvPr id="27" name="Rectangle 26">
+              <a:extLst>
+                <a:ext uri="{FF2B5EF4-FFF2-40B4-BE49-F238E27FC236}">
+                  <a16:creationId xmlns:a16="http://schemas.microsoft.com/office/drawing/2014/main" id="{16F89FD9-D24B-DB48-B31A-A37DCCE3E3BA}"/>
+                </a:ext>
+              </a:extLst>
+            </p:cNvPr>
+            <p:cNvSpPr/>
+            <p:nvPr/>
+          </p:nvSpPr>
+          <p:spPr>
+            <a:xfrm>
+              <a:off x="7665679" y="942663"/>
+              <a:ext cx="3142593" cy="3951890"/>
+            </a:xfrm>
+            <a:prstGeom prst="rect">
+              <a:avLst/>
+            </a:prstGeom>
+            <a:solidFill>
+              <a:schemeClr val="accent2">
+                <a:lumMod val="40000"/>
+                <a:lumOff val="60000"/>
+              </a:schemeClr>
+            </a:solidFill>
+          </p:spPr>
+          <p:style>
+            <a:lnRef idx="2">
+              <a:schemeClr val="accent1">
+                <a:shade val="50000"/>
+              </a:schemeClr>
+            </a:lnRef>
+            <a:fillRef idx="1">
+              <a:schemeClr val="accent1"/>
+            </a:fillRef>
+            <a:effectRef idx="0">
+              <a:schemeClr val="accent1"/>
+            </a:effectRef>
+            <a:fontRef idx="minor">
+              <a:schemeClr val="lt1"/>
+            </a:fontRef>
+          </p:style>
+          <p:txBody>
+            <a:bodyPr rtlCol="0" anchor="ctr"/>
+            <a:lstStyle/>
+            <a:p>
+              <a:pPr algn="ctr"/>
+              <a:r>
+                <a:rPr lang="en-US" dirty="0"/>
+                <a:t>po</a:t>
+              </a:r>
+            </a:p>
+          </p:txBody>
+        </p:sp>
+        <p:sp>
+          <p:nvSpPr>
+            <p:cNvPr id="28" name="Rectangle 27">
+              <a:extLst>
+                <a:ext uri="{FF2B5EF4-FFF2-40B4-BE49-F238E27FC236}">
+                  <a16:creationId xmlns:a16="http://schemas.microsoft.com/office/drawing/2014/main" id="{E0B4354B-F9E6-BC4D-81E4-F3ABB9186D2A}"/>
+                </a:ext>
+              </a:extLst>
+            </p:cNvPr>
+            <p:cNvSpPr/>
+            <p:nvPr/>
+          </p:nvSpPr>
+          <p:spPr>
+            <a:xfrm>
+              <a:off x="7957743" y="1334814"/>
+              <a:ext cx="2617076" cy="2289895"/>
+            </a:xfrm>
+            <a:prstGeom prst="rect">
+              <a:avLst/>
+            </a:prstGeom>
+            <a:solidFill>
+              <a:srgbClr val="FFFF00"/>
+            </a:solidFill>
+          </p:spPr>
+          <p:style>
+            <a:lnRef idx="2">
+              <a:schemeClr val="accent1">
+                <a:shade val="50000"/>
+              </a:schemeClr>
+            </a:lnRef>
+            <a:fillRef idx="1">
+              <a:schemeClr val="accent1"/>
+            </a:fillRef>
+            <a:effectRef idx="0">
+              <a:schemeClr val="accent1"/>
+            </a:effectRef>
+            <a:fontRef idx="minor">
+              <a:schemeClr val="lt1"/>
+            </a:fontRef>
+          </p:style>
+          <p:txBody>
+            <a:bodyPr rtlCol="0" anchor="ctr"/>
+            <a:lstStyle/>
+            <a:p>
+              <a:pPr algn="ctr"/>
+              <a:endParaRPr lang="en-US"/>
+            </a:p>
+          </p:txBody>
+        </p:sp>
+        <p:sp>
+          <p:nvSpPr>
+            <p:cNvPr id="29" name="TextBox 28">
+              <a:extLst>
+                <a:ext uri="{FF2B5EF4-FFF2-40B4-BE49-F238E27FC236}">
+                  <a16:creationId xmlns:a16="http://schemas.microsoft.com/office/drawing/2014/main" id="{8CA3AB63-D8A7-5648-AE7D-A9BF61270291}"/>
+                </a:ext>
+              </a:extLst>
+            </p:cNvPr>
+            <p:cNvSpPr txBox="1"/>
+            <p:nvPr/>
+          </p:nvSpPr>
+          <p:spPr>
+            <a:xfrm>
+              <a:off x="8222929" y="2918608"/>
+              <a:ext cx="2086707" cy="321317"/>
+            </a:xfrm>
+            <a:prstGeom prst="rect">
+              <a:avLst/>
+            </a:prstGeom>
+            <a:solidFill>
+              <a:schemeClr val="accent6"/>
+            </a:solidFill>
+          </p:spPr>
+          <p:txBody>
+            <a:bodyPr wrap="square" rtlCol="0">
+              <a:spAutoFit/>
+            </a:bodyPr>
+            <a:lstStyle/>
+            <a:p>
+              <a:pPr algn="ctr"/>
+              <a:r>
+                <a:rPr lang="en-US" sz="1200" dirty="0">
+                  <a:solidFill>
+                    <a:schemeClr val="bg1"/>
+                  </a:solidFill>
+                </a:rPr>
+                <a:t>YKT simulation server</a:t>
+              </a:r>
+            </a:p>
+          </p:txBody>
+        </p:sp>
+        <p:sp>
+          <p:nvSpPr>
+            <p:cNvPr id="30" name="TextBox 29">
+              <a:extLst>
+                <a:ext uri="{FF2B5EF4-FFF2-40B4-BE49-F238E27FC236}">
+                  <a16:creationId xmlns:a16="http://schemas.microsoft.com/office/drawing/2014/main" id="{F72A2121-5B0F-C445-A181-4584A0D0D1C7}"/>
+                </a:ext>
+              </a:extLst>
+            </p:cNvPr>
+            <p:cNvSpPr txBox="1"/>
+            <p:nvPr/>
+          </p:nvSpPr>
+          <p:spPr>
+            <a:xfrm>
+              <a:off x="8222928" y="1762214"/>
+              <a:ext cx="2086707" cy="307777"/>
+            </a:xfrm>
+            <a:prstGeom prst="rect">
+              <a:avLst/>
+            </a:prstGeom>
+            <a:solidFill>
+              <a:srgbClr val="0070C0"/>
+            </a:solidFill>
+          </p:spPr>
+          <p:txBody>
+            <a:bodyPr wrap="square" rtlCol="0">
+              <a:spAutoFit/>
+            </a:bodyPr>
+            <a:lstStyle/>
+            <a:p>
+              <a:pPr algn="ctr"/>
+              <a:r>
+                <a:rPr lang="en-US" sz="1400" dirty="0">
+                  <a:solidFill>
+                    <a:schemeClr val="bg1"/>
+                  </a:solidFill>
+                </a:rPr>
+                <a:t>KAR sidecar</a:t>
+              </a:r>
+            </a:p>
+          </p:txBody>
+        </p:sp>
+        <p:cxnSp>
+          <p:nvCxnSpPr>
+            <p:cNvPr id="31" name="Straight Arrow Connector 30">
+              <a:extLst>
+                <a:ext uri="{FF2B5EF4-FFF2-40B4-BE49-F238E27FC236}">
+                  <a16:creationId xmlns:a16="http://schemas.microsoft.com/office/drawing/2014/main" id="{A67583E5-D4A1-194C-A1E0-E3EA70265668}"/>
+                </a:ext>
+              </a:extLst>
+            </p:cNvPr>
+            <p:cNvCxnSpPr>
+              <a:cxnSpLocks/>
+              <a:stCxn id="30" idx="2"/>
+              <a:endCxn id="29" idx="0"/>
+            </p:cNvCxnSpPr>
+            <p:nvPr/>
+          </p:nvCxnSpPr>
+          <p:spPr>
+            <a:xfrm>
+              <a:off x="9266282" y="2069991"/>
+              <a:ext cx="1" cy="848617"/>
+            </a:xfrm>
+            <a:prstGeom prst="straightConnector1">
+              <a:avLst/>
+            </a:prstGeom>
+            <a:ln w="38100">
+              <a:headEnd type="triangle"/>
+              <a:tailEnd type="triangle"/>
+            </a:ln>
+          </p:spPr>
+          <p:style>
+            <a:lnRef idx="1">
+              <a:schemeClr val="accent1"/>
+            </a:lnRef>
+            <a:fillRef idx="0">
+              <a:schemeClr val="accent1"/>
+            </a:fillRef>
+            <a:effectRef idx="0">
+              <a:schemeClr val="accent1"/>
+            </a:effectRef>
+            <a:fontRef idx="minor">
+              <a:schemeClr val="tx1"/>
+            </a:fontRef>
+          </p:style>
+        </p:cxnSp>
+        <p:sp>
+          <p:nvSpPr>
+            <p:cNvPr id="32" name="TextBox 31">
+              <a:extLst>
+                <a:ext uri="{FF2B5EF4-FFF2-40B4-BE49-F238E27FC236}">
+                  <a16:creationId xmlns:a16="http://schemas.microsoft.com/office/drawing/2014/main" id="{F2FF397B-D48E-0342-833E-651E5131EDCB}"/>
+                </a:ext>
+              </a:extLst>
+            </p:cNvPr>
+            <p:cNvSpPr txBox="1"/>
+            <p:nvPr/>
+          </p:nvSpPr>
+          <p:spPr>
+            <a:xfrm>
+              <a:off x="9266281" y="2399833"/>
+              <a:ext cx="914400" cy="369332"/>
+            </a:xfrm>
+            <a:prstGeom prst="rect">
+              <a:avLst/>
+            </a:prstGeom>
+            <a:noFill/>
+          </p:spPr>
+          <p:txBody>
+            <a:bodyPr wrap="square" rtlCol="0">
+              <a:spAutoFit/>
+            </a:bodyPr>
+            <a:lstStyle/>
+            <a:p>
+              <a:r>
+                <a:rPr lang="en-US" dirty="0"/>
+                <a:t>http</a:t>
+              </a:r>
+            </a:p>
+          </p:txBody>
+        </p:sp>
+        <p:sp>
+          <p:nvSpPr>
+            <p:cNvPr id="33" name="Rectangle 32">
+              <a:extLst>
+                <a:ext uri="{FF2B5EF4-FFF2-40B4-BE49-F238E27FC236}">
+                  <a16:creationId xmlns:a16="http://schemas.microsoft.com/office/drawing/2014/main" id="{C319C804-C5C9-F240-9236-42EA5D9C833A}"/>
+                </a:ext>
+              </a:extLst>
+            </p:cNvPr>
+            <p:cNvSpPr/>
+            <p:nvPr/>
+          </p:nvSpPr>
+          <p:spPr>
+            <a:xfrm>
+              <a:off x="7957743" y="3822610"/>
+              <a:ext cx="2617076" cy="867412"/>
+            </a:xfrm>
+            <a:prstGeom prst="rect">
+              <a:avLst/>
+            </a:prstGeom>
+            <a:solidFill>
+              <a:srgbClr val="FFFF00"/>
+            </a:solidFill>
+          </p:spPr>
+          <p:style>
+            <a:lnRef idx="2">
+              <a:schemeClr val="accent1">
+                <a:shade val="50000"/>
+              </a:schemeClr>
+            </a:lnRef>
+            <a:fillRef idx="1">
+              <a:schemeClr val="accent1"/>
+            </a:fillRef>
+            <a:effectRef idx="0">
+              <a:schemeClr val="accent1"/>
+            </a:effectRef>
+            <a:fontRef idx="minor">
+              <a:schemeClr val="lt1"/>
+            </a:fontRef>
+          </p:style>
+          <p:txBody>
+            <a:bodyPr rtlCol="0" anchor="ctr"/>
+            <a:lstStyle/>
+            <a:p>
+              <a:pPr algn="ctr"/>
+              <a:endParaRPr lang="en-US"/>
+            </a:p>
+          </p:txBody>
+        </p:sp>
+        <p:sp>
+          <p:nvSpPr>
+            <p:cNvPr id="34" name="TextBox 33">
+              <a:extLst>
+                <a:ext uri="{FF2B5EF4-FFF2-40B4-BE49-F238E27FC236}">
+                  <a16:creationId xmlns:a16="http://schemas.microsoft.com/office/drawing/2014/main" id="{B80EB03D-4D31-E442-89AB-FCA3AB27B3F5}"/>
+                </a:ext>
+              </a:extLst>
+            </p:cNvPr>
+            <p:cNvSpPr txBox="1"/>
+            <p:nvPr/>
+          </p:nvSpPr>
+          <p:spPr>
+            <a:xfrm>
+              <a:off x="8222928" y="4171235"/>
+              <a:ext cx="2086707" cy="307777"/>
+            </a:xfrm>
+            <a:prstGeom prst="rect">
+              <a:avLst/>
+            </a:prstGeom>
+            <a:solidFill>
+              <a:srgbClr val="0070C0"/>
+            </a:solidFill>
+          </p:spPr>
+          <p:txBody>
+            <a:bodyPr wrap="square" rtlCol="0">
+              <a:spAutoFit/>
+            </a:bodyPr>
+            <a:lstStyle/>
+            <a:p>
+              <a:pPr algn="ctr"/>
+              <a:r>
+                <a:rPr lang="en-US" sz="1400" dirty="0" err="1">
+                  <a:solidFill>
+                    <a:schemeClr val="bg1"/>
+                  </a:solidFill>
+                </a:rPr>
+                <a:t>Coligo</a:t>
+              </a:r>
+              <a:r>
+                <a:rPr lang="en-US" sz="1400" dirty="0">
+                  <a:solidFill>
+                    <a:schemeClr val="bg1"/>
+                  </a:solidFill>
+                </a:rPr>
+                <a:t> queue proxy</a:t>
+              </a:r>
+            </a:p>
+          </p:txBody>
+        </p:sp>
+        <p:sp>
+          <p:nvSpPr>
+            <p:cNvPr id="35" name="TextBox 34">
+              <a:extLst>
+                <a:ext uri="{FF2B5EF4-FFF2-40B4-BE49-F238E27FC236}">
+                  <a16:creationId xmlns:a16="http://schemas.microsoft.com/office/drawing/2014/main" id="{0EACDABF-4EC4-E240-BF9A-738EFBBAA1C5}"/>
+                </a:ext>
+              </a:extLst>
+            </p:cNvPr>
+            <p:cNvSpPr txBox="1"/>
+            <p:nvPr/>
+          </p:nvSpPr>
+          <p:spPr>
+            <a:xfrm>
+              <a:off x="7626667" y="936448"/>
+              <a:ext cx="662152" cy="307777"/>
+            </a:xfrm>
+            <a:prstGeom prst="rect">
+              <a:avLst/>
+            </a:prstGeom>
+            <a:noFill/>
+          </p:spPr>
+          <p:txBody>
+            <a:bodyPr wrap="square" rtlCol="0">
+              <a:spAutoFit/>
+            </a:bodyPr>
+            <a:lstStyle/>
+            <a:p>
+              <a:r>
+                <a:rPr lang="en-US" sz="1400" dirty="0"/>
+                <a:t>pod</a:t>
+              </a:r>
+            </a:p>
+          </p:txBody>
+        </p:sp>
+        <p:sp>
+          <p:nvSpPr>
+            <p:cNvPr id="36" name="TextBox 35">
+              <a:extLst>
+                <a:ext uri="{FF2B5EF4-FFF2-40B4-BE49-F238E27FC236}">
+                  <a16:creationId xmlns:a16="http://schemas.microsoft.com/office/drawing/2014/main" id="{A8CA4474-160E-2548-BCD0-A48A6E633453}"/>
+                </a:ext>
+              </a:extLst>
+            </p:cNvPr>
+            <p:cNvSpPr txBox="1"/>
+            <p:nvPr/>
+          </p:nvSpPr>
+          <p:spPr>
+            <a:xfrm>
+              <a:off x="7961381" y="1373978"/>
+              <a:ext cx="2086706" cy="307777"/>
+            </a:xfrm>
+            <a:prstGeom prst="rect">
+              <a:avLst/>
+            </a:prstGeom>
+            <a:noFill/>
+          </p:spPr>
+          <p:txBody>
+            <a:bodyPr wrap="square" rtlCol="0">
+              <a:spAutoFit/>
+            </a:bodyPr>
+            <a:lstStyle/>
+            <a:p>
+              <a:r>
+                <a:rPr lang="en-US" sz="1400" dirty="0"/>
+                <a:t>user container</a:t>
+              </a:r>
+            </a:p>
+          </p:txBody>
+        </p:sp>
+        <p:sp>
+          <p:nvSpPr>
+            <p:cNvPr id="37" name="TextBox 36">
+              <a:extLst>
+                <a:ext uri="{FF2B5EF4-FFF2-40B4-BE49-F238E27FC236}">
+                  <a16:creationId xmlns:a16="http://schemas.microsoft.com/office/drawing/2014/main" id="{A663D597-1E4A-6445-A16A-997917ECABBF}"/>
+                </a:ext>
+              </a:extLst>
+            </p:cNvPr>
+            <p:cNvSpPr txBox="1"/>
+            <p:nvPr/>
+          </p:nvSpPr>
+          <p:spPr>
+            <a:xfrm>
+              <a:off x="7957743" y="3812257"/>
+              <a:ext cx="2541076" cy="307777"/>
+            </a:xfrm>
+            <a:prstGeom prst="rect">
+              <a:avLst/>
+            </a:prstGeom>
+            <a:noFill/>
+          </p:spPr>
+          <p:txBody>
+            <a:bodyPr wrap="square" rtlCol="0">
+              <a:spAutoFit/>
+            </a:bodyPr>
+            <a:lstStyle/>
+            <a:p>
+              <a:r>
+                <a:rPr lang="en-US" sz="1400" dirty="0" err="1"/>
+                <a:t>Coligo</a:t>
+              </a:r>
+              <a:r>
+                <a:rPr lang="en-US" sz="1400" dirty="0"/>
+                <a:t> system container</a:t>
+              </a:r>
+            </a:p>
+          </p:txBody>
+        </p:sp>
+      </p:grpSp>
+      <p:grpSp>
+        <p:nvGrpSpPr>
+          <p:cNvPr id="38" name="Group 37">
+            <a:extLst>
+              <a:ext uri="{FF2B5EF4-FFF2-40B4-BE49-F238E27FC236}">
+                <a16:creationId xmlns:a16="http://schemas.microsoft.com/office/drawing/2014/main" id="{2DC4774E-EA1A-2C4C-A364-D7C1AEE7AE42}"/>
+              </a:ext>
+            </a:extLst>
+          </p:cNvPr>
+          <p:cNvGrpSpPr/>
+          <p:nvPr/>
+        </p:nvGrpSpPr>
+        <p:grpSpPr>
+          <a:xfrm>
+            <a:off x="1310964" y="3379137"/>
+            <a:ext cx="2086708" cy="1494948"/>
+            <a:chOff x="5964621" y="2868403"/>
+            <a:chExt cx="2086708" cy="1494948"/>
+          </a:xfrm>
+        </p:grpSpPr>
+        <p:sp>
+          <p:nvSpPr>
+            <p:cNvPr id="39" name="TextBox 38">
+              <a:extLst>
+                <a:ext uri="{FF2B5EF4-FFF2-40B4-BE49-F238E27FC236}">
+                  <a16:creationId xmlns:a16="http://schemas.microsoft.com/office/drawing/2014/main" id="{29209EC1-7924-2640-9CD0-2657E8C71826}"/>
+                </a:ext>
+              </a:extLst>
+            </p:cNvPr>
+            <p:cNvSpPr txBox="1"/>
+            <p:nvPr/>
+          </p:nvSpPr>
+          <p:spPr>
+            <a:xfrm>
+              <a:off x="5964622" y="4024797"/>
+              <a:ext cx="2086707" cy="338554"/>
+            </a:xfrm>
+            <a:prstGeom prst="rect">
+              <a:avLst/>
+            </a:prstGeom>
+            <a:solidFill>
+              <a:schemeClr val="accent6"/>
+            </a:solidFill>
+          </p:spPr>
+          <p:txBody>
+            <a:bodyPr wrap="square" rtlCol="0">
+              <a:spAutoFit/>
+            </a:bodyPr>
+            <a:lstStyle/>
+            <a:p>
+              <a:pPr algn="ctr"/>
+              <a:r>
+                <a:rPr lang="en-US" sz="1600" dirty="0">
+                  <a:solidFill>
+                    <a:schemeClr val="bg1"/>
+                  </a:solidFill>
+                </a:rPr>
+                <a:t>YKT simulation client</a:t>
+              </a:r>
+            </a:p>
+          </p:txBody>
+        </p:sp>
+        <p:sp>
+          <p:nvSpPr>
+            <p:cNvPr id="40" name="TextBox 39">
+              <a:extLst>
+                <a:ext uri="{FF2B5EF4-FFF2-40B4-BE49-F238E27FC236}">
+                  <a16:creationId xmlns:a16="http://schemas.microsoft.com/office/drawing/2014/main" id="{1958AA99-E6D2-754A-9F32-95FA39B01BBC}"/>
+                </a:ext>
+              </a:extLst>
+            </p:cNvPr>
+            <p:cNvSpPr txBox="1"/>
+            <p:nvPr/>
+          </p:nvSpPr>
+          <p:spPr>
+            <a:xfrm>
+              <a:off x="5964621" y="2868403"/>
+              <a:ext cx="2086707" cy="400110"/>
+            </a:xfrm>
+            <a:prstGeom prst="rect">
+              <a:avLst/>
+            </a:prstGeom>
+            <a:solidFill>
+              <a:srgbClr val="0070C0"/>
+            </a:solidFill>
+          </p:spPr>
+          <p:txBody>
+            <a:bodyPr wrap="square" rtlCol="0">
+              <a:spAutoFit/>
+            </a:bodyPr>
+            <a:lstStyle/>
+            <a:p>
+              <a:pPr algn="ctr"/>
+              <a:r>
+                <a:rPr lang="en-US" sz="2000" dirty="0">
+                  <a:solidFill>
+                    <a:schemeClr val="bg1"/>
+                  </a:solidFill>
+                </a:rPr>
+                <a:t>KAR sidecar</a:t>
+              </a:r>
+            </a:p>
+          </p:txBody>
+        </p:sp>
+        <p:cxnSp>
+          <p:nvCxnSpPr>
+            <p:cNvPr id="41" name="Straight Arrow Connector 40">
+              <a:extLst>
+                <a:ext uri="{FF2B5EF4-FFF2-40B4-BE49-F238E27FC236}">
+                  <a16:creationId xmlns:a16="http://schemas.microsoft.com/office/drawing/2014/main" id="{78C1A54A-69D2-0B41-B1AD-D2A9CC999D07}"/>
+                </a:ext>
+              </a:extLst>
+            </p:cNvPr>
+            <p:cNvCxnSpPr>
+              <a:cxnSpLocks/>
+              <a:stCxn id="40" idx="2"/>
+              <a:endCxn id="39" idx="0"/>
+            </p:cNvCxnSpPr>
+            <p:nvPr/>
+          </p:nvCxnSpPr>
+          <p:spPr>
+            <a:xfrm>
+              <a:off x="7007975" y="3268513"/>
+              <a:ext cx="1" cy="756284"/>
+            </a:xfrm>
+            <a:prstGeom prst="straightConnector1">
+              <a:avLst/>
+            </a:prstGeom>
+            <a:ln w="38100">
+              <a:headEnd type="triangle"/>
+              <a:tailEnd type="triangle"/>
+            </a:ln>
+          </p:spPr>
+          <p:style>
+            <a:lnRef idx="1">
+              <a:schemeClr val="accent1"/>
+            </a:lnRef>
+            <a:fillRef idx="0">
+              <a:schemeClr val="accent1"/>
+            </a:fillRef>
+            <a:effectRef idx="0">
+              <a:schemeClr val="accent1"/>
+            </a:effectRef>
+            <a:fontRef idx="minor">
+              <a:schemeClr val="tx1"/>
+            </a:fontRef>
+          </p:style>
+        </p:cxnSp>
+        <p:sp>
+          <p:nvSpPr>
+            <p:cNvPr id="42" name="TextBox 41">
+              <a:extLst>
+                <a:ext uri="{FF2B5EF4-FFF2-40B4-BE49-F238E27FC236}">
+                  <a16:creationId xmlns:a16="http://schemas.microsoft.com/office/drawing/2014/main" id="{6A0A4A2D-8523-FA4C-BF41-CEB79FFEB601}"/>
+                </a:ext>
+              </a:extLst>
+            </p:cNvPr>
+            <p:cNvSpPr txBox="1"/>
+            <p:nvPr/>
+          </p:nvSpPr>
+          <p:spPr>
+            <a:xfrm>
+              <a:off x="7007974" y="3506022"/>
+              <a:ext cx="914400" cy="369332"/>
+            </a:xfrm>
+            <a:prstGeom prst="rect">
+              <a:avLst/>
+            </a:prstGeom>
+            <a:noFill/>
+          </p:spPr>
+          <p:txBody>
+            <a:bodyPr wrap="square" rtlCol="0">
+              <a:spAutoFit/>
+            </a:bodyPr>
+            <a:lstStyle/>
+            <a:p>
+              <a:r>
+                <a:rPr lang="en-US" dirty="0"/>
+                <a:t>http</a:t>
+              </a:r>
+            </a:p>
+          </p:txBody>
+        </p:sp>
+      </p:grpSp>
+      <p:sp>
+        <p:nvSpPr>
+          <p:cNvPr id="43" name="TextBox 42">
+            <a:extLst>
+              <a:ext uri="{FF2B5EF4-FFF2-40B4-BE49-F238E27FC236}">
+                <a16:creationId xmlns:a16="http://schemas.microsoft.com/office/drawing/2014/main" id="{7B6B9CBA-F9C4-D84D-87BC-2FC29EFC5263}"/>
+              </a:ext>
+            </a:extLst>
+          </p:cNvPr>
+          <p:cNvSpPr txBox="1"/>
+          <p:nvPr/>
+        </p:nvSpPr>
+        <p:spPr>
+          <a:xfrm>
+            <a:off x="810510" y="2336800"/>
+            <a:ext cx="2870200" cy="369332"/>
+          </a:xfrm>
+          <a:prstGeom prst="rect">
+            <a:avLst/>
+          </a:prstGeom>
+          <a:noFill/>
+        </p:spPr>
+        <p:txBody>
+          <a:bodyPr wrap="square" rtlCol="0">
+            <a:spAutoFit/>
+          </a:bodyPr>
+          <a:lstStyle/>
+          <a:p>
+            <a:r>
+              <a:rPr lang="en-US" dirty="0"/>
+              <a:t>Developer Laptop</a:t>
+            </a:r>
+          </a:p>
+        </p:txBody>
+      </p:sp>
+      <p:cxnSp>
+        <p:nvCxnSpPr>
+          <p:cNvPr id="44" name="Straight Arrow Connector 43">
+            <a:extLst>
+              <a:ext uri="{FF2B5EF4-FFF2-40B4-BE49-F238E27FC236}">
+                <a16:creationId xmlns:a16="http://schemas.microsoft.com/office/drawing/2014/main" id="{74A6FC70-AEB9-2440-92EA-A53CC98C603E}"/>
+              </a:ext>
+            </a:extLst>
+          </p:cNvPr>
+          <p:cNvCxnSpPr>
+            <a:cxnSpLocks/>
+          </p:cNvCxnSpPr>
+          <p:nvPr/>
+        </p:nvCxnSpPr>
+        <p:spPr>
+          <a:xfrm flipH="1">
+            <a:off x="2323348" y="1409944"/>
+            <a:ext cx="1383322" cy="1968433"/>
+          </a:xfrm>
+          <a:prstGeom prst="straightConnector1">
+            <a:avLst/>
+          </a:prstGeom>
+          <a:ln w="38100">
+            <a:headEnd type="triangle"/>
+            <a:tailEnd type="triangle"/>
+          </a:ln>
+        </p:spPr>
+        <p:style>
+          <a:lnRef idx="1">
+            <a:schemeClr val="accent1"/>
+          </a:lnRef>
+          <a:fillRef idx="0">
+            <a:schemeClr val="accent1"/>
+          </a:fillRef>
+          <a:effectRef idx="0">
+            <a:schemeClr val="accent1"/>
+          </a:effectRef>
+          <a:fontRef idx="minor">
+            <a:schemeClr val="tx1"/>
+          </a:fontRef>
+        </p:style>
+      </p:cxnSp>
+      <p:cxnSp>
+        <p:nvCxnSpPr>
+          <p:cNvPr id="45" name="Straight Arrow Connector 44">
+            <a:extLst>
+              <a:ext uri="{FF2B5EF4-FFF2-40B4-BE49-F238E27FC236}">
+                <a16:creationId xmlns:a16="http://schemas.microsoft.com/office/drawing/2014/main" id="{A794F69F-F119-BC4C-AD6D-202B8FD83158}"/>
+              </a:ext>
+            </a:extLst>
+          </p:cNvPr>
+          <p:cNvCxnSpPr>
+            <a:cxnSpLocks/>
+            <a:stCxn id="4" idx="3"/>
+            <a:endCxn id="40" idx="0"/>
+          </p:cNvCxnSpPr>
+          <p:nvPr/>
+        </p:nvCxnSpPr>
+        <p:spPr>
+          <a:xfrm flipH="1">
+            <a:off x="2354318" y="1591327"/>
+            <a:ext cx="4460329" cy="1787810"/>
+          </a:xfrm>
+          <a:prstGeom prst="straightConnector1">
+            <a:avLst/>
+          </a:prstGeom>
+          <a:ln w="38100">
+            <a:headEnd type="triangle"/>
+            <a:tailEnd type="triangle"/>
+          </a:ln>
+        </p:spPr>
+        <p:style>
+          <a:lnRef idx="1">
+            <a:schemeClr val="accent1"/>
+          </a:lnRef>
+          <a:fillRef idx="0">
+            <a:schemeClr val="accent1"/>
+          </a:fillRef>
+          <a:effectRef idx="0">
+            <a:schemeClr val="accent1"/>
+          </a:effectRef>
+          <a:fontRef idx="minor">
+            <a:schemeClr val="tx1"/>
+          </a:fontRef>
+        </p:style>
+      </p:cxnSp>
+      <p:cxnSp>
+        <p:nvCxnSpPr>
+          <p:cNvPr id="47" name="Straight Arrow Connector 46">
+            <a:extLst>
+              <a:ext uri="{FF2B5EF4-FFF2-40B4-BE49-F238E27FC236}">
+                <a16:creationId xmlns:a16="http://schemas.microsoft.com/office/drawing/2014/main" id="{1F14E7D7-F1C7-C542-8CF1-E0036BF718FA}"/>
+              </a:ext>
+            </a:extLst>
+          </p:cNvPr>
+          <p:cNvCxnSpPr>
+            <a:cxnSpLocks/>
+          </p:cNvCxnSpPr>
+          <p:nvPr/>
+        </p:nvCxnSpPr>
+        <p:spPr>
+          <a:xfrm>
+            <a:off x="4460151" y="1435255"/>
+            <a:ext cx="2918768" cy="2041338"/>
+          </a:xfrm>
+          <a:prstGeom prst="straightConnector1">
+            <a:avLst/>
+          </a:prstGeom>
+          <a:ln w="38100">
+            <a:headEnd type="triangle"/>
+            <a:tailEnd type="triangle"/>
+          </a:ln>
+        </p:spPr>
+        <p:style>
+          <a:lnRef idx="1">
+            <a:schemeClr val="accent1"/>
+          </a:lnRef>
+          <a:fillRef idx="0">
+            <a:schemeClr val="accent1"/>
+          </a:fillRef>
+          <a:effectRef idx="0">
+            <a:schemeClr val="accent1"/>
+          </a:effectRef>
+          <a:fontRef idx="minor">
+            <a:schemeClr val="tx1"/>
+          </a:fontRef>
+        </p:style>
+      </p:cxnSp>
+      <p:cxnSp>
+        <p:nvCxnSpPr>
+          <p:cNvPr id="49" name="Straight Arrow Connector 48">
+            <a:extLst>
+              <a:ext uri="{FF2B5EF4-FFF2-40B4-BE49-F238E27FC236}">
+                <a16:creationId xmlns:a16="http://schemas.microsoft.com/office/drawing/2014/main" id="{613E5E66-DB46-A540-8F12-60AB5F64DA79}"/>
+              </a:ext>
+            </a:extLst>
+          </p:cNvPr>
+          <p:cNvCxnSpPr>
+            <a:cxnSpLocks/>
+          </p:cNvCxnSpPr>
+          <p:nvPr/>
+        </p:nvCxnSpPr>
+        <p:spPr>
+          <a:xfrm>
+            <a:off x="4589946" y="1435255"/>
+            <a:ext cx="6115956" cy="2078377"/>
+          </a:xfrm>
+          <a:prstGeom prst="straightConnector1">
+            <a:avLst/>
+          </a:prstGeom>
+          <a:ln w="38100">
+            <a:headEnd type="triangle"/>
+            <a:tailEnd type="triangle"/>
+          </a:ln>
+        </p:spPr>
+        <p:style>
+          <a:lnRef idx="1">
+            <a:schemeClr val="accent1"/>
+          </a:lnRef>
+          <a:fillRef idx="0">
+            <a:schemeClr val="accent1"/>
+          </a:fillRef>
+          <a:effectRef idx="0">
+            <a:schemeClr val="accent1"/>
+          </a:effectRef>
+          <a:fontRef idx="minor">
+            <a:schemeClr val="tx1"/>
+          </a:fontRef>
+        </p:style>
+      </p:cxnSp>
+      <p:cxnSp>
+        <p:nvCxnSpPr>
+          <p:cNvPr id="51" name="Straight Arrow Connector 50">
+            <a:extLst>
+              <a:ext uri="{FF2B5EF4-FFF2-40B4-BE49-F238E27FC236}">
+                <a16:creationId xmlns:a16="http://schemas.microsoft.com/office/drawing/2014/main" id="{54A850EB-9FB4-C947-AA6E-D2147D99C23D}"/>
+              </a:ext>
+            </a:extLst>
+          </p:cNvPr>
+          <p:cNvCxnSpPr>
+            <a:cxnSpLocks/>
+            <a:stCxn id="4" idx="3"/>
+            <a:endCxn id="18" idx="0"/>
+          </p:cNvCxnSpPr>
+          <p:nvPr/>
+        </p:nvCxnSpPr>
+        <p:spPr>
+          <a:xfrm>
+            <a:off x="6814647" y="1591327"/>
+            <a:ext cx="564273" cy="1918779"/>
+          </a:xfrm>
+          <a:prstGeom prst="straightConnector1">
+            <a:avLst/>
+          </a:prstGeom>
+          <a:ln w="38100">
+            <a:headEnd type="triangle"/>
+            <a:tailEnd type="triangle"/>
+          </a:ln>
+        </p:spPr>
+        <p:style>
+          <a:lnRef idx="1">
+            <a:schemeClr val="accent1"/>
+          </a:lnRef>
+          <a:fillRef idx="0">
+            <a:schemeClr val="accent1"/>
+          </a:fillRef>
+          <a:effectRef idx="0">
+            <a:schemeClr val="accent1"/>
+          </a:effectRef>
+          <a:fontRef idx="minor">
+            <a:schemeClr val="tx1"/>
+          </a:fontRef>
+        </p:style>
+      </p:cxnSp>
+      <p:cxnSp>
+        <p:nvCxnSpPr>
+          <p:cNvPr id="54" name="Straight Arrow Connector 53">
+            <a:extLst>
+              <a:ext uri="{FF2B5EF4-FFF2-40B4-BE49-F238E27FC236}">
+                <a16:creationId xmlns:a16="http://schemas.microsoft.com/office/drawing/2014/main" id="{8C05BE96-1C51-4041-BAF1-B412B73C90F2}"/>
+              </a:ext>
+            </a:extLst>
+          </p:cNvPr>
+          <p:cNvCxnSpPr>
+            <a:cxnSpLocks/>
+            <a:stCxn id="4" idx="3"/>
+          </p:cNvCxnSpPr>
+          <p:nvPr/>
+        </p:nvCxnSpPr>
+        <p:spPr>
+          <a:xfrm>
+            <a:off x="6814647" y="1591327"/>
+            <a:ext cx="4050664" cy="1889298"/>
+          </a:xfrm>
+          <a:prstGeom prst="straightConnector1">
+            <a:avLst/>
+          </a:prstGeom>
+          <a:ln w="38100">
+            <a:headEnd type="triangle"/>
+            <a:tailEnd type="triangle"/>
+          </a:ln>
+        </p:spPr>
+        <p:style>
+          <a:lnRef idx="1">
+            <a:schemeClr val="accent1"/>
+          </a:lnRef>
+          <a:fillRef idx="0">
+            <a:schemeClr val="accent1"/>
+          </a:fillRef>
+          <a:effectRef idx="0">
+            <a:schemeClr val="accent1"/>
+          </a:effectRef>
+          <a:fontRef idx="minor">
+            <a:schemeClr val="tx1"/>
+          </a:fontRef>
+        </p:style>
+      </p:cxnSp>
+    </p:spTree>
+    <p:extLst>
+      <p:ext uri="{BB962C8B-B14F-4D97-AF65-F5344CB8AC3E}">
+        <p14:creationId xmlns:p14="http://schemas.microsoft.com/office/powerpoint/2010/main" val="331701655"/>
+      </p:ext>
+    </p:extLst>
+  </p:cSld>
+  <p:clrMapOvr>
+    <a:masterClrMapping/>
+  </p:clrMapOvr>
 </p:sld>
 </file>
 

</xml_diff>